<commit_message>
Added URLs and views for all non-JSON pages
</commit_message>
<xml_diff>
--- a/Design.pptx
+++ b/Design.pptx
@@ -271,7 +271,7 @@
           <a:p>
             <a:fld id="{024E5DF5-AF62-4343-8CE7-18234A59FB3C}" type="datetimeFigureOut">
               <a:rPr lang="en-GB" smtClean="0"/>
-              <a:t>01/08/2021</a:t>
+              <a:t>10/08/2021</a:t>
             </a:fld>
             <a:endParaRPr lang="en-GB"/>
           </a:p>
@@ -471,7 +471,7 @@
           <a:p>
             <a:fld id="{024E5DF5-AF62-4343-8CE7-18234A59FB3C}" type="datetimeFigureOut">
               <a:rPr lang="en-GB" smtClean="0"/>
-              <a:t>01/08/2021</a:t>
+              <a:t>10/08/2021</a:t>
             </a:fld>
             <a:endParaRPr lang="en-GB"/>
           </a:p>
@@ -681,7 +681,7 @@
           <a:p>
             <a:fld id="{024E5DF5-AF62-4343-8CE7-18234A59FB3C}" type="datetimeFigureOut">
               <a:rPr lang="en-GB" smtClean="0"/>
-              <a:t>01/08/2021</a:t>
+              <a:t>10/08/2021</a:t>
             </a:fld>
             <a:endParaRPr lang="en-GB"/>
           </a:p>
@@ -881,7 +881,7 @@
           <a:p>
             <a:fld id="{024E5DF5-AF62-4343-8CE7-18234A59FB3C}" type="datetimeFigureOut">
               <a:rPr lang="en-GB" smtClean="0"/>
-              <a:t>01/08/2021</a:t>
+              <a:t>10/08/2021</a:t>
             </a:fld>
             <a:endParaRPr lang="en-GB"/>
           </a:p>
@@ -1157,7 +1157,7 @@
           <a:p>
             <a:fld id="{024E5DF5-AF62-4343-8CE7-18234A59FB3C}" type="datetimeFigureOut">
               <a:rPr lang="en-GB" smtClean="0"/>
-              <a:t>01/08/2021</a:t>
+              <a:t>10/08/2021</a:t>
             </a:fld>
             <a:endParaRPr lang="en-GB"/>
           </a:p>
@@ -1425,7 +1425,7 @@
           <a:p>
             <a:fld id="{024E5DF5-AF62-4343-8CE7-18234A59FB3C}" type="datetimeFigureOut">
               <a:rPr lang="en-GB" smtClean="0"/>
-              <a:t>01/08/2021</a:t>
+              <a:t>10/08/2021</a:t>
             </a:fld>
             <a:endParaRPr lang="en-GB"/>
           </a:p>
@@ -1840,7 +1840,7 @@
           <a:p>
             <a:fld id="{024E5DF5-AF62-4343-8CE7-18234A59FB3C}" type="datetimeFigureOut">
               <a:rPr lang="en-GB" smtClean="0"/>
-              <a:t>01/08/2021</a:t>
+              <a:t>10/08/2021</a:t>
             </a:fld>
             <a:endParaRPr lang="en-GB"/>
           </a:p>
@@ -1982,7 +1982,7 @@
           <a:p>
             <a:fld id="{024E5DF5-AF62-4343-8CE7-18234A59FB3C}" type="datetimeFigureOut">
               <a:rPr lang="en-GB" smtClean="0"/>
-              <a:t>01/08/2021</a:t>
+              <a:t>10/08/2021</a:t>
             </a:fld>
             <a:endParaRPr lang="en-GB"/>
           </a:p>
@@ -2095,7 +2095,7 @@
           <a:p>
             <a:fld id="{024E5DF5-AF62-4343-8CE7-18234A59FB3C}" type="datetimeFigureOut">
               <a:rPr lang="en-GB" smtClean="0"/>
-              <a:t>01/08/2021</a:t>
+              <a:t>10/08/2021</a:t>
             </a:fld>
             <a:endParaRPr lang="en-GB"/>
           </a:p>
@@ -2408,7 +2408,7 @@
           <a:p>
             <a:fld id="{024E5DF5-AF62-4343-8CE7-18234A59FB3C}" type="datetimeFigureOut">
               <a:rPr lang="en-GB" smtClean="0"/>
-              <a:t>01/08/2021</a:t>
+              <a:t>10/08/2021</a:t>
             </a:fld>
             <a:endParaRPr lang="en-GB"/>
           </a:p>
@@ -2697,7 +2697,7 @@
           <a:p>
             <a:fld id="{024E5DF5-AF62-4343-8CE7-18234A59FB3C}" type="datetimeFigureOut">
               <a:rPr lang="en-GB" smtClean="0"/>
-              <a:t>01/08/2021</a:t>
+              <a:t>10/08/2021</a:t>
             </a:fld>
             <a:endParaRPr lang="en-GB"/>
           </a:p>
@@ -2940,7 +2940,7 @@
           <a:p>
             <a:fld id="{024E5DF5-AF62-4343-8CE7-18234A59FB3C}" type="datetimeFigureOut">
               <a:rPr lang="en-GB" smtClean="0"/>
-              <a:t>01/08/2021</a:t>
+              <a:t>10/08/2021</a:t>
             </a:fld>
             <a:endParaRPr lang="en-GB"/>
           </a:p>
@@ -3968,7 +3968,7 @@
                 <a:effectLst/>
                 <a:latin typeface="Encode Sans SC" pitchFamily="2" charset="0"/>
               </a:rPr>
-              <a:t>}/overview/</a:t>
+              <a:t>}/</a:t>
             </a:r>
           </a:p>
           <a:p>
@@ -4001,7 +4001,7 @@
                 <a:effectLst/>
                 <a:latin typeface="Encode Sans SC" pitchFamily="2" charset="0"/>
               </a:rPr>
-              <a:t>}/enter</a:t>
+              <a:t>}/enter/</a:t>
             </a:r>
           </a:p>
           <a:p>
@@ -4034,7 +4034,7 @@
                 <a:effectLst/>
                 <a:latin typeface="Encode Sans SC" pitchFamily="2" charset="0"/>
               </a:rPr>
-              <a:t>}/predict</a:t>
+              <a:t>}/predict/</a:t>
             </a:r>
           </a:p>
           <a:p>

</xml_diff>

<commit_message>
Created database schema and edited ER diagram to match
</commit_message>
<xml_diff>
--- a/Design.pptx
+++ b/Design.pptx
@@ -5715,10 +5715,10 @@
       </p:sp>
       <p:pic>
         <p:nvPicPr>
-          <p:cNvPr id="9" name="Picture 8" descr="Diagram&#10;&#10;Description automatically generated">
-            <a:extLst>
-              <a:ext uri="{FF2B5EF4-FFF2-40B4-BE49-F238E27FC236}">
-                <a16:creationId xmlns:a16="http://schemas.microsoft.com/office/drawing/2014/main" id="{FC8096C7-174E-450B-B008-4B806D5CBCD5}"/>
+          <p:cNvPr id="4" name="Picture 3" descr="Diagram&#10;&#10;Description automatically generated">
+            <a:extLst>
+              <a:ext uri="{FF2B5EF4-FFF2-40B4-BE49-F238E27FC236}">
+                <a16:creationId xmlns:a16="http://schemas.microsoft.com/office/drawing/2014/main" id="{10C032FA-75D1-4074-84E2-49A08253D757}"/>
               </a:ext>
             </a:extLst>
           </p:cNvPr>
@@ -5741,8 +5741,8 @@
         </p:blipFill>
         <p:spPr>
           <a:xfrm>
-            <a:off x="1515262" y="2155362"/>
-            <a:ext cx="9161473" cy="4408600"/>
+            <a:off x="1912219" y="2207679"/>
+            <a:ext cx="8367560" cy="4454547"/>
           </a:xfrm>
           <a:prstGeom prst="rect">
             <a:avLst/>

</xml_diff>